<commit_message>
#34 html 미연 수정
</commit_message>
<xml_diff>
--- a/textmask.pptx
+++ b/textmask.pptx
@@ -11,9 +11,9 @@
     <p:sldId id="257" r:id="rId2"/>
     <p:sldId id="260" r:id="rId3"/>
     <p:sldId id="287" r:id="rId4"/>
-    <p:sldId id="261" r:id="rId5"/>
+    <p:sldId id="289" r:id="rId5"/>
     <p:sldId id="288" r:id="rId6"/>
-    <p:sldId id="289" r:id="rId7"/>
+    <p:sldId id="261" r:id="rId7"/>
     <p:sldId id="258" r:id="rId8"/>
     <p:sldId id="290" r:id="rId9"/>
     <p:sldId id="291" r:id="rId10"/>
@@ -221,7 +221,7 @@
             <a:fld id="{65771C21-3757-4199-83DE-22960358A2A5}" type="datetimeFigureOut">
               <a:rPr lang="ko-KR" altLang="en-US" smtClean="0"/>
               <a:pPr/>
-              <a:t>2020-11-10</a:t>
+              <a:t>2020-11-11</a:t>
             </a:fld>
             <a:endParaRPr lang="ko-KR" altLang="en-US"/>
           </a:p>
@@ -1329,6 +1329,11 @@
         </p:txBody>
       </p:sp>
     </p:spTree>
+    <p:extLst>
+      <p:ext uri="{BB962C8B-B14F-4D97-AF65-F5344CB8AC3E}">
+        <p14:creationId xmlns:p14="http://schemas.microsoft.com/office/powerpoint/2010/main" val="4162874840"/>
+      </p:ext>
+    </p:extLst>
   </p:cSld>
   <p:clrMapOvr>
     <a:masterClrMapping/>
@@ -1546,11 +1551,6 @@
         </p:txBody>
       </p:sp>
     </p:spTree>
-    <p:extLst>
-      <p:ext uri="{BB962C8B-B14F-4D97-AF65-F5344CB8AC3E}">
-        <p14:creationId xmlns:p14="http://schemas.microsoft.com/office/powerpoint/2010/main" val="4162874840"/>
-      </p:ext>
-    </p:extLst>
   </p:cSld>
   <p:clrMapOvr>
     <a:masterClrMapping/>
@@ -2066,7 +2066,7 @@
             <a:fld id="{A22FE722-38C7-4231-8BB5-7A27D4E5977D}" type="datetimeFigureOut">
               <a:rPr lang="ko-KR" altLang="en-US" smtClean="0"/>
               <a:pPr/>
-              <a:t>2020-11-10</a:t>
+              <a:t>2020-11-11</a:t>
             </a:fld>
             <a:endParaRPr lang="ko-KR" altLang="en-US"/>
           </a:p>
@@ -2231,7 +2231,7 @@
             <a:fld id="{A22FE722-38C7-4231-8BB5-7A27D4E5977D}" type="datetimeFigureOut">
               <a:rPr lang="ko-KR" altLang="en-US" smtClean="0"/>
               <a:pPr/>
-              <a:t>2020-11-10</a:t>
+              <a:t>2020-11-11</a:t>
             </a:fld>
             <a:endParaRPr lang="ko-KR" altLang="en-US"/>
           </a:p>
@@ -2406,7 +2406,7 @@
             <a:fld id="{A22FE722-38C7-4231-8BB5-7A27D4E5977D}" type="datetimeFigureOut">
               <a:rPr lang="ko-KR" altLang="en-US" smtClean="0"/>
               <a:pPr/>
-              <a:t>2020-11-10</a:t>
+              <a:t>2020-11-11</a:t>
             </a:fld>
             <a:endParaRPr lang="ko-KR" altLang="en-US"/>
           </a:p>
@@ -2571,7 +2571,7 @@
             <a:fld id="{A22FE722-38C7-4231-8BB5-7A27D4E5977D}" type="datetimeFigureOut">
               <a:rPr lang="ko-KR" altLang="en-US" smtClean="0"/>
               <a:pPr/>
-              <a:t>2020-11-10</a:t>
+              <a:t>2020-11-11</a:t>
             </a:fld>
             <a:endParaRPr lang="ko-KR" altLang="en-US"/>
           </a:p>
@@ -2813,7 +2813,7 @@
             <a:fld id="{A22FE722-38C7-4231-8BB5-7A27D4E5977D}" type="datetimeFigureOut">
               <a:rPr lang="ko-KR" altLang="en-US" smtClean="0"/>
               <a:pPr/>
-              <a:t>2020-11-10</a:t>
+              <a:t>2020-11-11</a:t>
             </a:fld>
             <a:endParaRPr lang="ko-KR" altLang="en-US"/>
           </a:p>
@@ -3095,7 +3095,7 @@
             <a:fld id="{A22FE722-38C7-4231-8BB5-7A27D4E5977D}" type="datetimeFigureOut">
               <a:rPr lang="ko-KR" altLang="en-US" smtClean="0"/>
               <a:pPr/>
-              <a:t>2020-11-10</a:t>
+              <a:t>2020-11-11</a:t>
             </a:fld>
             <a:endParaRPr lang="ko-KR" altLang="en-US"/>
           </a:p>
@@ -3511,7 +3511,7 @@
             <a:fld id="{A22FE722-38C7-4231-8BB5-7A27D4E5977D}" type="datetimeFigureOut">
               <a:rPr lang="ko-KR" altLang="en-US" smtClean="0"/>
               <a:pPr/>
-              <a:t>2020-11-10</a:t>
+              <a:t>2020-11-11</a:t>
             </a:fld>
             <a:endParaRPr lang="ko-KR" altLang="en-US"/>
           </a:p>
@@ -3625,7 +3625,7 @@
             <a:fld id="{A22FE722-38C7-4231-8BB5-7A27D4E5977D}" type="datetimeFigureOut">
               <a:rPr lang="ko-KR" altLang="en-US" smtClean="0"/>
               <a:pPr/>
-              <a:t>2020-11-10</a:t>
+              <a:t>2020-11-11</a:t>
             </a:fld>
             <a:endParaRPr lang="ko-KR" altLang="en-US"/>
           </a:p>
@@ -3717,7 +3717,7 @@
             <a:fld id="{A22FE722-38C7-4231-8BB5-7A27D4E5977D}" type="datetimeFigureOut">
               <a:rPr lang="ko-KR" altLang="en-US" smtClean="0"/>
               <a:pPr/>
-              <a:t>2020-11-10</a:t>
+              <a:t>2020-11-11</a:t>
             </a:fld>
             <a:endParaRPr lang="ko-KR" altLang="en-US"/>
           </a:p>
@@ -3989,7 +3989,7 @@
             <a:fld id="{A22FE722-38C7-4231-8BB5-7A27D4E5977D}" type="datetimeFigureOut">
               <a:rPr lang="ko-KR" altLang="en-US" smtClean="0"/>
               <a:pPr/>
-              <a:t>2020-11-10</a:t>
+              <a:t>2020-11-11</a:t>
             </a:fld>
             <a:endParaRPr lang="ko-KR" altLang="en-US"/>
           </a:p>
@@ -4238,7 +4238,7 @@
             <a:fld id="{A22FE722-38C7-4231-8BB5-7A27D4E5977D}" type="datetimeFigureOut">
               <a:rPr lang="ko-KR" altLang="en-US" smtClean="0"/>
               <a:pPr/>
-              <a:t>2020-11-10</a:t>
+              <a:t>2020-11-11</a:t>
             </a:fld>
             <a:endParaRPr lang="ko-KR" altLang="en-US"/>
           </a:p>
@@ -4446,7 +4446,7 @@
             <a:fld id="{A22FE722-38C7-4231-8BB5-7A27D4E5977D}" type="datetimeFigureOut">
               <a:rPr lang="ko-KR" altLang="en-US" smtClean="0"/>
               <a:pPr/>
-              <a:t>2020-11-10</a:t>
+              <a:t>2020-11-11</a:t>
             </a:fld>
             <a:endParaRPr lang="ko-KR" altLang="en-US"/>
           </a:p>
@@ -7357,9 +7357,7 @@
     <p:bg>
       <p:bgPr>
         <a:solidFill>
-          <a:schemeClr val="tx2">
-            <a:lumMod val="75000"/>
-          </a:schemeClr>
+          <a:srgbClr val="17375E"/>
         </a:solidFill>
         <a:effectLst/>
       </p:bgPr>
@@ -7439,9 +7437,7 @@
             <a:avLst/>
           </a:prstGeom>
           <a:solidFill>
-            <a:schemeClr val="tx2">
-              <a:lumMod val="75000"/>
-            </a:schemeClr>
+            <a:srgbClr val="17375E"/>
           </a:solidFill>
           <a:ln>
             <a:noFill/>
@@ -7567,8 +7563,8 @@
         </p:nvSpPr>
         <p:spPr>
           <a:xfrm>
-            <a:off x="8274234" y="271681"/>
-            <a:ext cx="618246" cy="338554"/>
+            <a:off x="8303857" y="271681"/>
+            <a:ext cx="588623" cy="338554"/>
           </a:xfrm>
           <a:prstGeom prst="rect">
             <a:avLst/>
@@ -7582,12 +7578,12 @@
           <a:p>
             <a:pPr algn="r"/>
             <a:r>
-              <a:rPr lang="en-US" altLang="ko-KR" sz="1600" b="1" spc="-150" dirty="0" err="1">
+              <a:rPr lang="en-US" altLang="ko-KR" sz="1600" b="1" spc="-150" dirty="0">
                 <a:solidFill>
                   <a:schemeClr val="bg1"/>
                 </a:solidFill>
               </a:rPr>
-              <a:t>Keras</a:t>
+              <a:t>RNN</a:t>
             </a:r>
             <a:endParaRPr lang="ko-KR" altLang="en-US" sz="1600" b="1" spc="-150" dirty="0">
               <a:solidFill>
@@ -7599,52 +7595,40 @@
       </p:sp>
       <p:pic>
         <p:nvPicPr>
-          <p:cNvPr id="2050" name="Picture 2" descr="Keras 기초] 1장. Keras Intro. Version Info: (Python = 3.6, Keras =… | by 프시케 |  Medium">
+          <p:cNvPr id="10" name="image15.png">
             <a:extLst>
               <a:ext uri="{FF2B5EF4-FFF2-40B4-BE49-F238E27FC236}">
-                <a16:creationId xmlns:a16="http://schemas.microsoft.com/office/drawing/2014/main" id="{CF40C677-3C13-4BAB-A753-3F952C8896BD}"/>
+                <a16:creationId xmlns:a16="http://schemas.microsoft.com/office/drawing/2014/main" id="{E9C67A43-9AC1-42F7-9220-38EE280F890F}"/>
               </a:ext>
             </a:extLst>
           </p:cNvPr>
-          <p:cNvPicPr>
-            <a:picLocks noChangeAspect="1" noChangeArrowheads="1"/>
-          </p:cNvPicPr>
+          <p:cNvPicPr/>
           <p:nvPr/>
         </p:nvPicPr>
         <p:blipFill>
-          <a:blip r:embed="rId3">
-            <a:extLst>
-              <a:ext uri="{28A0092B-C50C-407E-A947-70E740481C1C}">
-                <a14:useLocalDpi xmlns:a14="http://schemas.microsoft.com/office/drawing/2010/main" val="0"/>
-              </a:ext>
-            </a:extLst>
-          </a:blip>
+          <a:blip r:embed="rId3"/>
           <a:srcRect/>
           <a:stretch>
             <a:fillRect/>
           </a:stretch>
         </p:blipFill>
-        <p:spPr bwMode="auto">
-          <a:xfrm>
-            <a:off x="1298448" y="2659917"/>
-            <a:ext cx="6547104" cy="1898206"/>
+        <p:spPr>
+          <a:xfrm>
+            <a:off x="1534598" y="1743342"/>
+            <a:ext cx="6002795" cy="2025714"/>
           </a:xfrm>
           <a:prstGeom prst="rect">
             <a:avLst/>
           </a:prstGeom>
-          <a:noFill/>
-          <a:extLst>
-            <a:ext uri="{909E8E84-426E-40DD-AFC4-6F175D3DCCD1}">
-              <a14:hiddenFill xmlns:a14="http://schemas.microsoft.com/office/drawing/2010/main">
-                <a:solidFill>
-                  <a:srgbClr val="FFFFFF"/>
-                </a:solidFill>
-              </a14:hiddenFill>
-            </a:ext>
-          </a:extLst>
+          <a:ln/>
         </p:spPr>
       </p:pic>
     </p:spTree>
+    <p:extLst>
+      <p:ext uri="{BB962C8B-B14F-4D97-AF65-F5344CB8AC3E}">
+        <p14:creationId xmlns:p14="http://schemas.microsoft.com/office/powerpoint/2010/main" val="1313852828"/>
+      </p:ext>
+    </p:extLst>
   </p:cSld>
   <p:clrMapOvr>
     <a:masterClrMapping/>
@@ -7943,7 +7927,9 @@
     <p:bg>
       <p:bgPr>
         <a:solidFill>
-          <a:srgbClr val="17375E"/>
+          <a:schemeClr val="tx2">
+            <a:lumMod val="75000"/>
+          </a:schemeClr>
         </a:solidFill>
         <a:effectLst/>
       </p:bgPr>
@@ -8023,7 +8009,9 @@
             <a:avLst/>
           </a:prstGeom>
           <a:solidFill>
-            <a:srgbClr val="17375E"/>
+            <a:schemeClr val="tx2">
+              <a:lumMod val="75000"/>
+            </a:schemeClr>
           </a:solidFill>
           <a:ln>
             <a:noFill/>
@@ -8149,8 +8137,8 @@
         </p:nvSpPr>
         <p:spPr>
           <a:xfrm>
-            <a:off x="8303857" y="271681"/>
-            <a:ext cx="588623" cy="338554"/>
+            <a:off x="8274234" y="271681"/>
+            <a:ext cx="618246" cy="338554"/>
           </a:xfrm>
           <a:prstGeom prst="rect">
             <a:avLst/>
@@ -8164,12 +8152,12 @@
           <a:p>
             <a:pPr algn="r"/>
             <a:r>
-              <a:rPr lang="en-US" altLang="ko-KR" sz="1600" b="1" spc="-150" dirty="0">
+              <a:rPr lang="en-US" altLang="ko-KR" sz="1600" b="1" spc="-150" dirty="0" err="1">
                 <a:solidFill>
                   <a:schemeClr val="bg1"/>
                 </a:solidFill>
               </a:rPr>
-              <a:t>RNN</a:t>
+              <a:t>Keras</a:t>
             </a:r>
             <a:endParaRPr lang="ko-KR" altLang="en-US" sz="1600" b="1" spc="-150" dirty="0">
               <a:solidFill>
@@ -8181,40 +8169,52 @@
       </p:sp>
       <p:pic>
         <p:nvPicPr>
-          <p:cNvPr id="10" name="image15.png">
+          <p:cNvPr id="2050" name="Picture 2" descr="Keras 기초] 1장. Keras Intro. Version Info: (Python = 3.6, Keras =… | by 프시케 |  Medium">
             <a:extLst>
               <a:ext uri="{FF2B5EF4-FFF2-40B4-BE49-F238E27FC236}">
-                <a16:creationId xmlns:a16="http://schemas.microsoft.com/office/drawing/2014/main" id="{E9C67A43-9AC1-42F7-9220-38EE280F890F}"/>
+                <a16:creationId xmlns:a16="http://schemas.microsoft.com/office/drawing/2014/main" id="{CF40C677-3C13-4BAB-A753-3F952C8896BD}"/>
               </a:ext>
             </a:extLst>
           </p:cNvPr>
-          <p:cNvPicPr/>
+          <p:cNvPicPr>
+            <a:picLocks noChangeAspect="1" noChangeArrowheads="1"/>
+          </p:cNvPicPr>
           <p:nvPr/>
         </p:nvPicPr>
         <p:blipFill>
-          <a:blip r:embed="rId3"/>
+          <a:blip r:embed="rId3">
+            <a:extLst>
+              <a:ext uri="{28A0092B-C50C-407E-A947-70E740481C1C}">
+                <a14:useLocalDpi xmlns:a14="http://schemas.microsoft.com/office/drawing/2010/main" val="0"/>
+              </a:ext>
+            </a:extLst>
+          </a:blip>
           <a:srcRect/>
           <a:stretch>
             <a:fillRect/>
           </a:stretch>
         </p:blipFill>
-        <p:spPr>
-          <a:xfrm>
-            <a:off x="1534598" y="1743342"/>
-            <a:ext cx="6002795" cy="2025714"/>
+        <p:spPr bwMode="auto">
+          <a:xfrm>
+            <a:off x="1298448" y="2659917"/>
+            <a:ext cx="6547104" cy="1898206"/>
           </a:xfrm>
           <a:prstGeom prst="rect">
             <a:avLst/>
           </a:prstGeom>
-          <a:ln/>
+          <a:noFill/>
+          <a:extLst>
+            <a:ext uri="{909E8E84-426E-40DD-AFC4-6F175D3DCCD1}">
+              <a14:hiddenFill xmlns:a14="http://schemas.microsoft.com/office/drawing/2010/main">
+                <a:solidFill>
+                  <a:srgbClr val="FFFFFF"/>
+                </a:solidFill>
+              </a14:hiddenFill>
+            </a:ext>
+          </a:extLst>
         </p:spPr>
       </p:pic>
     </p:spTree>
-    <p:extLst>
-      <p:ext uri="{BB962C8B-B14F-4D97-AF65-F5344CB8AC3E}">
-        <p14:creationId xmlns:p14="http://schemas.microsoft.com/office/powerpoint/2010/main" val="1313852828"/>
-      </p:ext>
-    </p:extLst>
   </p:cSld>
   <p:clrMapOvr>
     <a:masterClrMapping/>
@@ -8740,55 +8740,87 @@
           </a:p>
         </p:txBody>
       </p:sp>
-      <p:sp>
-        <p:nvSpPr>
-          <p:cNvPr id="6" name="직사각형 5">
+      <p:grpSp>
+        <p:nvGrpSpPr>
+          <p:cNvPr id="12" name="그룹 11">
             <a:extLst>
               <a:ext uri="{FF2B5EF4-FFF2-40B4-BE49-F238E27FC236}">
-                <a16:creationId xmlns:a16="http://schemas.microsoft.com/office/drawing/2014/main" id="{AD76F497-DCB3-404E-B16A-744AC3671BBE}"/>
+                <a16:creationId xmlns:a16="http://schemas.microsoft.com/office/drawing/2014/main" id="{99817353-AF60-4EF4-A40D-47D3EF20ABDB}"/>
               </a:ext>
             </a:extLst>
           </p:cNvPr>
-          <p:cNvSpPr/>
+          <p:cNvGrpSpPr/>
           <p:nvPr/>
-        </p:nvSpPr>
-        <p:spPr>
-          <a:xfrm>
-            <a:off x="1232879" y="2276872"/>
-            <a:ext cx="6492294" cy="2448272"/>
-          </a:xfrm>
-          <a:prstGeom prst="rect">
-            <a:avLst/>
-          </a:prstGeom>
-        </p:spPr>
-        <p:style>
-          <a:lnRef idx="2">
-            <a:schemeClr val="accent1">
-              <a:shade val="50000"/>
-            </a:schemeClr>
-          </a:lnRef>
-          <a:fillRef idx="1">
-            <a:schemeClr val="accent1"/>
-          </a:fillRef>
-          <a:effectRef idx="0">
-            <a:schemeClr val="accent1"/>
-          </a:effectRef>
-          <a:fontRef idx="minor">
-            <a:schemeClr val="lt1"/>
-          </a:fontRef>
-        </p:style>
-        <p:txBody>
-          <a:bodyPr rtlCol="0" anchor="ctr"/>
-          <a:lstStyle/>
-          <a:p>
-            <a:pPr algn="ctr"/>
-            <a:r>
-              <a:rPr lang="ko-KR" altLang="en-US" dirty="0"/>
-              <a:t>모델 학습 코드 사진</a:t>
-            </a:r>
-          </a:p>
-        </p:txBody>
-      </p:sp>
+        </p:nvGrpSpPr>
+        <p:grpSpPr>
+          <a:xfrm>
+            <a:off x="2483768" y="1053925"/>
+            <a:ext cx="4536503" cy="5502202"/>
+            <a:chOff x="395537" y="617241"/>
+            <a:chExt cx="4896544" cy="5938886"/>
+          </a:xfrm>
+        </p:grpSpPr>
+        <p:pic>
+          <p:nvPicPr>
+            <p:cNvPr id="8" name="그림 7">
+              <a:extLst>
+                <a:ext uri="{FF2B5EF4-FFF2-40B4-BE49-F238E27FC236}">
+                  <a16:creationId xmlns:a16="http://schemas.microsoft.com/office/drawing/2014/main" id="{9632F8BF-0400-4BEC-9B1B-BE18D207A652}"/>
+                </a:ext>
+              </a:extLst>
+            </p:cNvPr>
+            <p:cNvPicPr>
+              <a:picLocks noChangeAspect="1"/>
+            </p:cNvPicPr>
+            <p:nvPr/>
+          </p:nvPicPr>
+          <p:blipFill>
+            <a:blip r:embed="rId3"/>
+            <a:stretch>
+              <a:fillRect/>
+            </a:stretch>
+          </p:blipFill>
+          <p:spPr>
+            <a:xfrm>
+              <a:off x="395537" y="617241"/>
+              <a:ext cx="4896544" cy="3187644"/>
+            </a:xfrm>
+            <a:prstGeom prst="rect">
+              <a:avLst/>
+            </a:prstGeom>
+          </p:spPr>
+        </p:pic>
+        <p:pic>
+          <p:nvPicPr>
+            <p:cNvPr id="11" name="그림 10">
+              <a:extLst>
+                <a:ext uri="{FF2B5EF4-FFF2-40B4-BE49-F238E27FC236}">
+                  <a16:creationId xmlns:a16="http://schemas.microsoft.com/office/drawing/2014/main" id="{0ABE66AC-2E03-4FCC-AD10-99B4D7719943}"/>
+                </a:ext>
+              </a:extLst>
+            </p:cNvPr>
+            <p:cNvPicPr>
+              <a:picLocks noChangeAspect="1"/>
+            </p:cNvPicPr>
+            <p:nvPr/>
+          </p:nvPicPr>
+          <p:blipFill>
+            <a:blip r:embed="rId4"/>
+            <a:stretch>
+              <a:fillRect/>
+            </a:stretch>
+          </p:blipFill>
+          <p:spPr>
+            <a:xfrm>
+              <a:off x="395537" y="3778339"/>
+              <a:ext cx="4896544" cy="2777788"/>
+            </a:xfrm>
+            <a:prstGeom prst="rect">
+              <a:avLst/>
+            </a:prstGeom>
+          </p:spPr>
+        </p:pic>
+      </p:grpSp>
     </p:spTree>
     <p:extLst>
       <p:ext uri="{BB962C8B-B14F-4D97-AF65-F5344CB8AC3E}">
@@ -9041,55 +9073,36 @@
           </a:p>
         </p:txBody>
       </p:sp>
-      <p:sp>
-        <p:nvSpPr>
-          <p:cNvPr id="6" name="직사각형 5">
+      <p:pic>
+        <p:nvPicPr>
+          <p:cNvPr id="8" name="그림 7">
             <a:extLst>
               <a:ext uri="{FF2B5EF4-FFF2-40B4-BE49-F238E27FC236}">
-                <a16:creationId xmlns:a16="http://schemas.microsoft.com/office/drawing/2014/main" id="{ECDC5B7A-BA6E-4B7A-8323-9A95FB61B71F}"/>
+                <a16:creationId xmlns:a16="http://schemas.microsoft.com/office/drawing/2014/main" id="{C53A8EF7-FA2A-4CC9-83C8-128CA139CBC6}"/>
               </a:ext>
             </a:extLst>
           </p:cNvPr>
-          <p:cNvSpPr/>
+          <p:cNvPicPr>
+            <a:picLocks noChangeAspect="1"/>
+          </p:cNvPicPr>
           <p:nvPr/>
-        </p:nvSpPr>
-        <p:spPr>
-          <a:xfrm>
-            <a:off x="1232879" y="2276872"/>
-            <a:ext cx="6492294" cy="2448272"/>
+        </p:nvPicPr>
+        <p:blipFill>
+          <a:blip r:embed="rId3"/>
+          <a:stretch>
+            <a:fillRect/>
+          </a:stretch>
+        </p:blipFill>
+        <p:spPr>
+          <a:xfrm>
+            <a:off x="914400" y="1345755"/>
+            <a:ext cx="7315200" cy="4752975"/>
           </a:xfrm>
           <a:prstGeom prst="rect">
             <a:avLst/>
           </a:prstGeom>
         </p:spPr>
-        <p:style>
-          <a:lnRef idx="2">
-            <a:schemeClr val="accent1">
-              <a:shade val="50000"/>
-            </a:schemeClr>
-          </a:lnRef>
-          <a:fillRef idx="1">
-            <a:schemeClr val="accent1"/>
-          </a:fillRef>
-          <a:effectRef idx="0">
-            <a:schemeClr val="accent1"/>
-          </a:effectRef>
-          <a:fontRef idx="minor">
-            <a:schemeClr val="lt1"/>
-          </a:fontRef>
-        </p:style>
-        <p:txBody>
-          <a:bodyPr rtlCol="0" anchor="ctr"/>
-          <a:lstStyle/>
-          <a:p>
-            <a:pPr algn="ctr"/>
-            <a:r>
-              <a:rPr lang="ko-KR" altLang="en-US" dirty="0"/>
-              <a:t>정확도 측정 코드 사진</a:t>
-            </a:r>
-          </a:p>
-        </p:txBody>
-      </p:sp>
+      </p:pic>
     </p:spTree>
     <p:extLst>
       <p:ext uri="{BB962C8B-B14F-4D97-AF65-F5344CB8AC3E}">

</xml_diff>